<commit_message>
added results from study
</commit_message>
<xml_diff>
--- a/M5/results.pptx
+++ b/M5/results.pptx
@@ -104,6 +104,11 @@
       </a:defRPr>
     </a:lvl9pPr>
   </p:defaultTextStyle>
+  <p:extLst>
+    <p:ext uri="{EFAFB233-063F-42B5-8137-9DF3F51BA10A}">
+      <p15:sldGuideLst xmlns:p15="http://schemas.microsoft.com/office/powerpoint/2012/main"/>
+    </p:ext>
+  </p:extLst>
 </p:presentation>
 </file>
 
@@ -254,7 +259,7 @@
           <a:p>
             <a:fld id="{730573BF-833A-437B-99D8-DC357FAC4D3C}" type="datetimeFigureOut">
               <a:rPr lang="en-US" smtClean="0"/>
-              <a:t>11/14/2022</a:t>
+              <a:t>11/23/2022</a:t>
             </a:fld>
             <a:endParaRPr lang="en-US"/>
           </a:p>
@@ -452,7 +457,7 @@
           <a:p>
             <a:fld id="{730573BF-833A-437B-99D8-DC357FAC4D3C}" type="datetimeFigureOut">
               <a:rPr lang="en-US" smtClean="0"/>
-              <a:t>11/14/2022</a:t>
+              <a:t>11/23/2022</a:t>
             </a:fld>
             <a:endParaRPr lang="en-US"/>
           </a:p>
@@ -660,7 +665,7 @@
           <a:p>
             <a:fld id="{730573BF-833A-437B-99D8-DC357FAC4D3C}" type="datetimeFigureOut">
               <a:rPr lang="en-US" smtClean="0"/>
-              <a:t>11/14/2022</a:t>
+              <a:t>11/23/2022</a:t>
             </a:fld>
             <a:endParaRPr lang="en-US"/>
           </a:p>
@@ -858,7 +863,7 @@
           <a:p>
             <a:fld id="{730573BF-833A-437B-99D8-DC357FAC4D3C}" type="datetimeFigureOut">
               <a:rPr lang="en-US" smtClean="0"/>
-              <a:t>11/14/2022</a:t>
+              <a:t>11/23/2022</a:t>
             </a:fld>
             <a:endParaRPr lang="en-US"/>
           </a:p>
@@ -1133,7 +1138,7 @@
           <a:p>
             <a:fld id="{730573BF-833A-437B-99D8-DC357FAC4D3C}" type="datetimeFigureOut">
               <a:rPr lang="en-US" smtClean="0"/>
-              <a:t>11/14/2022</a:t>
+              <a:t>11/23/2022</a:t>
             </a:fld>
             <a:endParaRPr lang="en-US"/>
           </a:p>
@@ -1398,7 +1403,7 @@
           <a:p>
             <a:fld id="{730573BF-833A-437B-99D8-DC357FAC4D3C}" type="datetimeFigureOut">
               <a:rPr lang="en-US" smtClean="0"/>
-              <a:t>11/14/2022</a:t>
+              <a:t>11/23/2022</a:t>
             </a:fld>
             <a:endParaRPr lang="en-US"/>
           </a:p>
@@ -1810,7 +1815,7 @@
           <a:p>
             <a:fld id="{730573BF-833A-437B-99D8-DC357FAC4D3C}" type="datetimeFigureOut">
               <a:rPr lang="en-US" smtClean="0"/>
-              <a:t>11/14/2022</a:t>
+              <a:t>11/23/2022</a:t>
             </a:fld>
             <a:endParaRPr lang="en-US"/>
           </a:p>
@@ -1951,7 +1956,7 @@
           <a:p>
             <a:fld id="{730573BF-833A-437B-99D8-DC357FAC4D3C}" type="datetimeFigureOut">
               <a:rPr lang="en-US" smtClean="0"/>
-              <a:t>11/14/2022</a:t>
+              <a:t>11/23/2022</a:t>
             </a:fld>
             <a:endParaRPr lang="en-US"/>
           </a:p>
@@ -2064,7 +2069,7 @@
           <a:p>
             <a:fld id="{730573BF-833A-437B-99D8-DC357FAC4D3C}" type="datetimeFigureOut">
               <a:rPr lang="en-US" smtClean="0"/>
-              <a:t>11/14/2022</a:t>
+              <a:t>11/23/2022</a:t>
             </a:fld>
             <a:endParaRPr lang="en-US"/>
           </a:p>
@@ -2375,7 +2380,7 @@
           <a:p>
             <a:fld id="{730573BF-833A-437B-99D8-DC357FAC4D3C}" type="datetimeFigureOut">
               <a:rPr lang="en-US" smtClean="0"/>
-              <a:t>11/14/2022</a:t>
+              <a:t>11/23/2022</a:t>
             </a:fld>
             <a:endParaRPr lang="en-US"/>
           </a:p>
@@ -2663,7 +2668,7 @@
           <a:p>
             <a:fld id="{730573BF-833A-437B-99D8-DC357FAC4D3C}" type="datetimeFigureOut">
               <a:rPr lang="en-US" smtClean="0"/>
-              <a:t>11/14/2022</a:t>
+              <a:t>11/23/2022</a:t>
             </a:fld>
             <a:endParaRPr lang="en-US"/>
           </a:p>
@@ -2904,7 +2909,7 @@
           <a:p>
             <a:fld id="{730573BF-833A-437B-99D8-DC357FAC4D3C}" type="datetimeFigureOut">
               <a:rPr lang="en-US" smtClean="0"/>
-              <a:t>11/14/2022</a:t>
+              <a:t>11/23/2022</a:t>
             </a:fld>
             <a:endParaRPr lang="en-US"/>
           </a:p>
@@ -3339,7 +3344,7 @@
         </p:nvSpPr>
         <p:spPr>
           <a:xfrm>
-            <a:off x="971550" y="247649"/>
+            <a:off x="1135981" y="167438"/>
             <a:ext cx="9144000" cy="823913"/>
           </a:xfrm>
         </p:spPr>
@@ -3378,8 +3383,8 @@
         </p:blipFill>
         <p:spPr>
           <a:xfrm>
-            <a:off x="6096000" y="1651404"/>
-            <a:ext cx="5806109" cy="3136501"/>
+            <a:off x="5363745" y="1241389"/>
+            <a:ext cx="6417852" cy="3466969"/>
           </a:xfrm>
           <a:prstGeom prst="rect">
             <a:avLst/>
@@ -3400,8 +3405,8 @@
         </p:nvSpPr>
         <p:spPr>
           <a:xfrm>
-            <a:off x="410403" y="1071562"/>
-            <a:ext cx="3828637" cy="5909310"/>
+            <a:off x="362277" y="766762"/>
+            <a:ext cx="4089407" cy="7294305"/>
           </a:xfrm>
           <a:prstGeom prst="rect">
             <a:avLst/>
@@ -3425,8 +3430,12 @@
               <a:buChar char="•"/>
             </a:pPr>
             <a:r>
+              <a:rPr lang="en-US" b="1" dirty="0"/>
+              <a:t>What: </a:t>
+            </a:r>
+            <a:r>
               <a:rPr lang="en-US" dirty="0"/>
-              <a:t>Continuous multiplier based on y axis from accelerometer</a:t>
+              <a:t>Continuous movement range multiplier based on y axis from accelerometer</a:t>
             </a:r>
           </a:p>
           <a:p>
@@ -3435,8 +3444,12 @@
               <a:buChar char="•"/>
             </a:pPr>
             <a:r>
+              <a:rPr lang="en-US" b="1" dirty="0"/>
+              <a:t>Accuracy</a:t>
+            </a:r>
+            <a:r>
               <a:rPr lang="en-US" dirty="0"/>
-              <a:t>Results Accuracy: average of +/-5% error for intended angle multiplier  of -1, -.5, 0, .5, and 1 over 10 runs</a:t>
+              <a:t>: average error of .08 for multipliers of intended angles: 0, 45, 90, 35, and 180 (multipliers=  -1, -.5, 0, .5, and 1 )</a:t>
             </a:r>
           </a:p>
           <a:p>
@@ -3445,6 +3458,10 @@
               <a:buChar char="•"/>
             </a:pPr>
             <a:r>
+              <a:rPr lang="en-US" b="1" dirty="0"/>
+              <a:t>Con: </a:t>
+            </a:r>
+            <a:r>
               <a:rPr lang="en-US" dirty="0"/>
               <a:t>Lags with BLE reads, quick movements make it susceptible to noise</a:t>
             </a:r>
@@ -3459,6 +3476,10 @@
             </a:r>
           </a:p>
           <a:p>
+            <a:r>
+              <a:rPr lang="en-US" b="1" dirty="0"/>
+              <a:t>What: </a:t>
+            </a:r>
             <a:r>
               <a:rPr lang="en-US" dirty="0"/>
               <a:t>3 States based on Z axis accelerometer</a:t>
@@ -3496,14 +3517,22 @@
           </a:p>
           <a:p>
             <a:r>
+              <a:rPr lang="en-US" b="1" dirty="0"/>
+              <a:t>Accuracy</a:t>
+            </a:r>
+            <a:r>
               <a:rPr lang="en-US" dirty="0"/>
-              <a:t>Accuracy: 100%</a:t>
-            </a:r>
-          </a:p>
-          <a:p>
+              <a:t>: 100% (Measured 15 Flip up, 15 Flip down, and 15 Flip Flat for 2 users)</a:t>
+            </a:r>
+          </a:p>
+          <a:p>
+            <a:r>
+              <a:rPr lang="en-US" b="1" dirty="0"/>
+              <a:t>Con: </a:t>
+            </a:r>
             <a:r>
               <a:rPr lang="en-US" dirty="0"/>
-              <a:t>Cons: Only has 3 states so not as useful for moving as Gesture 1</a:t>
+              <a:t>Only has 3 states so not as useful for moving as Gesture 1</a:t>
             </a:r>
           </a:p>
           <a:p>
@@ -3531,8 +3560,8 @@
         </p:nvSpPr>
         <p:spPr>
           <a:xfrm>
-            <a:off x="5909021" y="5039139"/>
-            <a:ext cx="6282979" cy="1323439"/>
+            <a:off x="4783430" y="4904523"/>
+            <a:ext cx="7452685" cy="1569660"/>
           </a:xfrm>
           <a:prstGeom prst="rect">
             <a:avLst/>
@@ -3547,8 +3576,8 @@
           <a:p>
             <a:pPr algn="ctr"/>
             <a:r>
-              <a:rPr lang="en-US" sz="4000" dirty="0"/>
-              <a:t>Conclusion: Gesture 1 wins!!!!</a:t>
+              <a:rPr lang="en-US" sz="3200" dirty="0"/>
+              <a:t>Conclusion: Gesture 1 wins! It is more dynamic and was rated easier to use in user preference study</a:t>
             </a:r>
           </a:p>
         </p:txBody>

</xml_diff>